<commit_message>
added parallel textsearch diagram
</commit_message>
<xml_diff>
--- a/Resources/Build-On-5.pptx
+++ b/Resources/Build-On-5.pptx
@@ -5,7 +5,7 @@
     <p:sldMasterId id="2147483648" r:id="rId1"/>
   </p:sldMasterIdLst>
   <p:notesMasterIdLst>
-    <p:notesMasterId r:id="rId14"/>
+    <p:notesMasterId r:id="rId15"/>
   </p:notesMasterIdLst>
   <p:sldIdLst>
     <p:sldId id="264" r:id="rId2"/>
@@ -14,12 +14,13 @@
     <p:sldId id="270" r:id="rId5"/>
     <p:sldId id="269" r:id="rId6"/>
     <p:sldId id="262" r:id="rId7"/>
-    <p:sldId id="263" r:id="rId8"/>
-    <p:sldId id="267" r:id="rId9"/>
-    <p:sldId id="268" r:id="rId10"/>
-    <p:sldId id="266" r:id="rId11"/>
-    <p:sldId id="258" r:id="rId12"/>
-    <p:sldId id="257" r:id="rId13"/>
+    <p:sldId id="271" r:id="rId8"/>
+    <p:sldId id="263" r:id="rId9"/>
+    <p:sldId id="267" r:id="rId10"/>
+    <p:sldId id="268" r:id="rId11"/>
+    <p:sldId id="266" r:id="rId12"/>
+    <p:sldId id="258" r:id="rId13"/>
+    <p:sldId id="257" r:id="rId14"/>
   </p:sldIdLst>
   <p:sldSz cx="12192000" cy="6858000"/>
   <p:notesSz cx="7010400" cy="9296400"/>
@@ -3811,10 +3812,10 @@
       </p:grpSpPr>
       <p:sp>
         <p:nvSpPr>
-          <p:cNvPr id="2" name="Title 1">
-            <a:extLst>
-              <a:ext uri="{FF2B5EF4-FFF2-40B4-BE49-F238E27FC236}">
-                <a16:creationId xmlns:a16="http://schemas.microsoft.com/office/drawing/2014/main" id="{C89EC088-9816-42BA-9B35-86D3F702E665}"/>
+          <p:cNvPr id="6" name="Title 5">
+            <a:extLst>
+              <a:ext uri="{FF2B5EF4-FFF2-40B4-BE49-F238E27FC236}">
+                <a16:creationId xmlns:a16="http://schemas.microsoft.com/office/drawing/2014/main" id="{016B22EA-8754-40DE-8352-F8CD3840C4CE}"/>
               </a:ext>
             </a:extLst>
           </p:cNvPr>
@@ -3825,183 +3826,21 @@
             <p:ph type="title"/>
           </p:nvPr>
         </p:nvSpPr>
-        <p:spPr>
-          <a:xfrm>
-            <a:off x="838200" y="336551"/>
-            <a:ext cx="10515600" cy="992188"/>
-          </a:xfrm>
-          <a:solidFill>
-            <a:schemeClr val="accent3">
-              <a:lumMod val="20000"/>
-              <a:lumOff val="80000"/>
-            </a:schemeClr>
-          </a:solidFill>
-          <a:ln>
-            <a:solidFill>
-              <a:schemeClr val="tx1"/>
-            </a:solidFill>
-          </a:ln>
-        </p:spPr>
-        <p:txBody>
-          <a:bodyPr/>
-          <a:lstStyle/>
-          <a:p>
-            <a:r>
-              <a:rPr lang="en-US" dirty="0"/>
-              <a:t>How would I use Rust at work?</a:t>
-            </a:r>
-          </a:p>
-        </p:txBody>
-      </p:sp>
-      <p:sp>
-        <p:nvSpPr>
-          <p:cNvPr id="3" name="Content Placeholder 2">
-            <a:extLst>
-              <a:ext uri="{FF2B5EF4-FFF2-40B4-BE49-F238E27FC236}">
-                <a16:creationId xmlns:a16="http://schemas.microsoft.com/office/drawing/2014/main" id="{4FDD5838-DCD1-47D0-8889-4639DD3B4B3A}"/>
-              </a:ext>
-            </a:extLst>
-          </p:cNvPr>
-          <p:cNvSpPr>
-            <a:spLocks noGrp="1"/>
-          </p:cNvSpPr>
-          <p:nvPr>
-            <p:ph idx="1"/>
-          </p:nvPr>
-        </p:nvSpPr>
-        <p:spPr>
-          <a:xfrm>
-            <a:off x="838200" y="1564480"/>
-            <a:ext cx="10515600" cy="4786313"/>
-          </a:xfrm>
-        </p:spPr>
-        <p:txBody>
-          <a:bodyPr/>
-          <a:lstStyle/>
-          <a:p>
-            <a:r>
-              <a:rPr lang="en-US" dirty="0"/>
-              <a:t>Migrate parts of a large project to Rust using its foreign function interface:</a:t>
-            </a:r>
-          </a:p>
-          <a:p>
-            <a:pPr lvl="1"/>
-            <a:r>
-              <a:rPr lang="en-US" dirty="0"/>
-              <a:t>Piece-meal improvement: performance, safety of existing code-base</a:t>
-            </a:r>
-          </a:p>
-          <a:p>
-            <a:pPr lvl="1"/>
-            <a:r>
-              <a:rPr lang="en-US" dirty="0">
-                <a:hlinkClick r:id="rId2"/>
-              </a:rPr>
-              <a:t>https://locka99.gitbooks.io/a-guide-to-porting-c-to-rust/content/</a:t>
-            </a:r>
-          </a:p>
-          <a:p>
-            <a:pPr lvl="1"/>
-            <a:r>
-              <a:rPr lang="en-US" dirty="0">
-                <a:hlinkClick r:id="rId2"/>
-              </a:rPr>
-              <a:t>std::</a:t>
-            </a:r>
-            <a:r>
-              <a:rPr lang="en-US" dirty="0" err="1">
-                <a:hlinkClick r:id="rId2"/>
-              </a:rPr>
-              <a:t>ffi</a:t>
-            </a:r>
-            <a:endParaRPr lang="en-US" dirty="0"/>
-          </a:p>
-          <a:p>
-            <a:r>
-              <a:rPr lang="en-US" dirty="0"/>
-              <a:t>Use Rust generated </a:t>
-            </a:r>
-            <a:r>
-              <a:rPr lang="en-US" dirty="0" err="1"/>
-              <a:t>WebAssembly</a:t>
-            </a:r>
-            <a:r>
-              <a:rPr lang="en-US" dirty="0"/>
-              <a:t> to speed JavaScript processing</a:t>
-            </a:r>
-          </a:p>
-          <a:p>
-            <a:pPr lvl="1"/>
-            <a:r>
-              <a:rPr lang="en-US" dirty="0">
-                <a:hlinkClick r:id="rId3"/>
-              </a:rPr>
-              <a:t>https://rustwasm.github.io/book/</a:t>
-            </a:r>
-            <a:endParaRPr lang="en-US" dirty="0"/>
-          </a:p>
-          <a:p>
-            <a:r>
-              <a:rPr lang="en-US" dirty="0"/>
-              <a:t>Start new projects in Rust</a:t>
-            </a:r>
-          </a:p>
-          <a:p>
-            <a:pPr lvl="1"/>
-            <a:r>
-              <a:rPr lang="en-US" dirty="0"/>
-              <a:t>Create fast, sound code with lots of help from compiler messages</a:t>
-            </a:r>
-          </a:p>
-          <a:p>
-            <a:pPr lvl="1"/>
-            <a:r>
-              <a:rPr lang="en-US" dirty="0"/>
-              <a:t>Great tooling: </a:t>
-            </a:r>
-            <a:r>
-              <a:rPr lang="en-US" dirty="0" err="1">
-                <a:hlinkClick r:id="rId4"/>
-              </a:rPr>
-              <a:t>RustBites_Tooling</a:t>
-            </a:r>
-            <a:r>
-              <a:rPr lang="en-US" dirty="0"/>
-              <a:t>, works on Windows, Linux, macOS</a:t>
-            </a:r>
-          </a:p>
-          <a:p>
-            <a:pPr lvl="1"/>
-            <a:r>
-              <a:rPr lang="en-US" dirty="0"/>
-              <a:t>Resources: e-books, active user forum, </a:t>
-            </a:r>
-            <a:r>
-              <a:rPr lang="en-US" dirty="0">
-                <a:hlinkClick r:id="rId5"/>
-              </a:rPr>
-              <a:t>https://crates.io</a:t>
-            </a:r>
-            <a:endParaRPr lang="en-US" dirty="0"/>
-          </a:p>
-          <a:p>
-            <a:pPr marL="457200" lvl="1" indent="0">
-              <a:buNone/>
-            </a:pPr>
-            <a:endParaRPr lang="en-US" dirty="0"/>
-          </a:p>
-          <a:p>
-            <a:pPr lvl="1"/>
-            <a:endParaRPr lang="en-US" dirty="0"/>
-          </a:p>
-        </p:txBody>
-      </p:sp>
-      <p:sp>
-        <p:nvSpPr>
-          <p:cNvPr id="4" name="Slide Number Placeholder 3">
-            <a:extLst>
-              <a:ext uri="{FF2B5EF4-FFF2-40B4-BE49-F238E27FC236}">
-                <a16:creationId xmlns:a16="http://schemas.microsoft.com/office/drawing/2014/main" id="{C1458565-BAB9-4E63-9E45-DD37D1BD1A4F}"/>
+        <p:spPr/>
+        <p:txBody>
+          <a:bodyPr/>
+          <a:lstStyle/>
+          <a:p>
+            <a:endParaRPr lang="en-US"/>
+          </a:p>
+        </p:txBody>
+      </p:sp>
+      <p:sp>
+        <p:nvSpPr>
+          <p:cNvPr id="5" name="Slide Number Placeholder 4">
+            <a:extLst>
+              <a:ext uri="{FF2B5EF4-FFF2-40B4-BE49-F238E27FC236}">
+                <a16:creationId xmlns:a16="http://schemas.microsoft.com/office/drawing/2014/main" id="{06F1D7FA-9D75-4499-9E0F-85952ECDE993}"/>
               </a:ext>
             </a:extLst>
           </p:cNvPr>
@@ -4021,14 +3860,50 @@
               <a:rPr lang="en-US" smtClean="0"/>
               <a:t>10</a:t>
             </a:fld>
-            <a:endParaRPr lang="en-US" dirty="0"/>
-          </a:p>
-        </p:txBody>
-      </p:sp>
+            <a:endParaRPr lang="en-US"/>
+          </a:p>
+        </p:txBody>
+      </p:sp>
+      <p:pic>
+        <p:nvPicPr>
+          <p:cNvPr id="8" name="Picture 7" descr="Text&#10;&#10;Description automatically generated">
+            <a:extLst>
+              <a:ext uri="{FF2B5EF4-FFF2-40B4-BE49-F238E27FC236}">
+                <a16:creationId xmlns:a16="http://schemas.microsoft.com/office/drawing/2014/main" id="{1E04C856-02CD-40B9-8ED7-25E6C6BDC7E8}"/>
+              </a:ext>
+            </a:extLst>
+          </p:cNvPr>
+          <p:cNvPicPr>
+            <a:picLocks noChangeAspect="1"/>
+          </p:cNvPicPr>
+          <p:nvPr/>
+        </p:nvPicPr>
+        <p:blipFill>
+          <a:blip r:embed="rId2">
+            <a:extLst>
+              <a:ext uri="{28A0092B-C50C-407E-A947-70E740481C1C}">
+                <a14:useLocalDpi xmlns:a14="http://schemas.microsoft.com/office/drawing/2010/main" val="0"/>
+              </a:ext>
+            </a:extLst>
+          </a:blip>
+          <a:stretch>
+            <a:fillRect/>
+          </a:stretch>
+        </p:blipFill>
+        <p:spPr>
+          <a:xfrm>
+            <a:off x="497250" y="196831"/>
+            <a:ext cx="11197499" cy="6464338"/>
+          </a:xfrm>
+          <a:prstGeom prst="rect">
+            <a:avLst/>
+          </a:prstGeom>
+        </p:spPr>
+      </p:pic>
     </p:spTree>
     <p:extLst>
       <p:ext uri="{BB962C8B-B14F-4D97-AF65-F5344CB8AC3E}">
-        <p14:creationId xmlns:p14="http://schemas.microsoft.com/office/powerpoint/2010/main" val="2809018068"/>
+        <p14:creationId xmlns:p14="http://schemas.microsoft.com/office/powerpoint/2010/main" val="1780744226"/>
       </p:ext>
     </p:extLst>
   </p:cSld>
@@ -4060,7 +3935,7 @@
           <p:cNvPr id="2" name="Title 1">
             <a:extLst>
               <a:ext uri="{FF2B5EF4-FFF2-40B4-BE49-F238E27FC236}">
-                <a16:creationId xmlns:a16="http://schemas.microsoft.com/office/drawing/2014/main" id="{3A1D5CF7-0D4F-4BAE-BA2C-566B721B4B29}"/>
+                <a16:creationId xmlns:a16="http://schemas.microsoft.com/office/drawing/2014/main" id="{C89EC088-9816-42BA-9B35-86D3F702E665}"/>
               </a:ext>
             </a:extLst>
           </p:cNvPr>
@@ -4071,28 +3946,30 @@
             <p:ph type="title"/>
           </p:nvPr>
         </p:nvSpPr>
-        <p:spPr/>
-        <p:style>
-          <a:lnRef idx="2">
-            <a:schemeClr val="accent3"/>
-          </a:lnRef>
-          <a:fillRef idx="1">
-            <a:schemeClr val="lt1"/>
-          </a:fillRef>
-          <a:effectRef idx="0">
-            <a:schemeClr val="accent3"/>
-          </a:effectRef>
-          <a:fontRef idx="minor">
-            <a:schemeClr val="dk1"/>
-          </a:fontRef>
-        </p:style>
+        <p:spPr>
+          <a:xfrm>
+            <a:off x="838200" y="336551"/>
+            <a:ext cx="10515600" cy="992188"/>
+          </a:xfrm>
+          <a:solidFill>
+            <a:schemeClr val="accent3">
+              <a:lumMod val="20000"/>
+              <a:lumOff val="80000"/>
+            </a:schemeClr>
+          </a:solidFill>
+          <a:ln>
+            <a:solidFill>
+              <a:schemeClr val="tx1"/>
+            </a:solidFill>
+          </a:ln>
+        </p:spPr>
         <p:txBody>
           <a:bodyPr/>
           <a:lstStyle/>
           <a:p>
             <a:r>
               <a:rPr lang="en-US" dirty="0"/>
-              <a:t>Build-On Motivation</a:t>
+              <a:t>How would I use Rust at work?</a:t>
             </a:r>
           </a:p>
         </p:txBody>
@@ -4102,7 +3979,7 @@
           <p:cNvPr id="3" name="Content Placeholder 2">
             <a:extLst>
               <a:ext uri="{FF2B5EF4-FFF2-40B4-BE49-F238E27FC236}">
-                <a16:creationId xmlns:a16="http://schemas.microsoft.com/office/drawing/2014/main" id="{0E456118-B98A-4F38-8E30-CD16C343A8CA}"/>
+                <a16:creationId xmlns:a16="http://schemas.microsoft.com/office/drawing/2014/main" id="{4FDD5838-DCD1-47D0-8889-4639DD3B4B3A}"/>
               </a:ext>
             </a:extLst>
           </p:cNvPr>
@@ -4113,71 +3990,130 @@
             <p:ph idx="1"/>
           </p:nvPr>
         </p:nvSpPr>
-        <p:spPr/>
+        <p:spPr>
+          <a:xfrm>
+            <a:off x="838200" y="1564480"/>
+            <a:ext cx="10515600" cy="4786313"/>
+          </a:xfrm>
+        </p:spPr>
         <p:txBody>
           <a:bodyPr/>
           <a:lstStyle/>
           <a:p>
             <a:r>
               <a:rPr lang="en-US" dirty="0"/>
-              <a:t>Participate in a developer community interested in learning Rust</a:t>
-            </a:r>
-          </a:p>
-          <a:p>
+              <a:t>Migrate parts of a large project to Rust using its foreign function interface:</a:t>
+            </a:r>
+          </a:p>
+          <a:p>
+            <a:pPr lvl="1"/>
             <a:r>
               <a:rPr lang="en-US" dirty="0"/>
-              <a:t>Stay in contact with SU Computer Engineering and Computer Science alumni</a:t>
-            </a:r>
+              <a:t>Piece-meal improvement: performance, safety of existing code-base</a:t>
+            </a:r>
+          </a:p>
+          <a:p>
+            <a:pPr lvl="1"/>
+            <a:r>
+              <a:rPr lang="en-US" dirty="0">
+                <a:hlinkClick r:id="rId2"/>
+              </a:rPr>
+              <a:t>https://locka99.gitbooks.io/a-guide-to-porting-c-to-rust/content/</a:t>
+            </a:r>
+          </a:p>
+          <a:p>
+            <a:pPr lvl="1"/>
+            <a:r>
+              <a:rPr lang="en-US" dirty="0">
+                <a:hlinkClick r:id="rId2"/>
+              </a:rPr>
+              <a:t>std::</a:t>
+            </a:r>
+            <a:r>
+              <a:rPr lang="en-US" dirty="0" err="1">
+                <a:hlinkClick r:id="rId2"/>
+              </a:rPr>
+              <a:t>ffi</a:t>
+            </a:r>
+            <a:endParaRPr lang="en-US" dirty="0"/>
           </a:p>
           <a:p>
             <a:r>
               <a:rPr lang="en-US" dirty="0"/>
-              <a:t>Support conversations about Rust and other interesting tech topics</a:t>
+              <a:t>Use Rust generated </a:t>
+            </a:r>
+            <a:r>
+              <a:rPr lang="en-US" dirty="0" err="1"/>
+              <a:t>WebAssembly</a:t>
+            </a:r>
+            <a:r>
+              <a:rPr lang="en-US" dirty="0"/>
+              <a:t> to speed JavaScript processing</a:t>
             </a:r>
           </a:p>
           <a:p>
             <a:pPr lvl="1"/>
             <a:r>
+              <a:rPr lang="en-US" dirty="0">
+                <a:hlinkClick r:id="rId3"/>
+              </a:rPr>
+              <a:t>https://rustwasm.github.io/book/</a:t>
+            </a:r>
+            <a:endParaRPr lang="en-US" dirty="0"/>
+          </a:p>
+          <a:p>
+            <a:r>
               <a:rPr lang="en-US" dirty="0"/>
-              <a:t>Encourage both active learners and curious browsers</a:t>
-            </a:r>
-          </a:p>
-          <a:p>
+              <a:t>Start new projects in Rust</a:t>
+            </a:r>
+          </a:p>
+          <a:p>
+            <a:pPr lvl="1"/>
             <a:r>
               <a:rPr lang="en-US" dirty="0"/>
-              <a:t>Rust is a very clever language supporting development of secure, high performance code (same ballpark as C++ without </a:t>
-            </a:r>
-            <a:r>
-              <a:rPr lang="en-US"/>
-              <a:t>undefined behavior)</a:t>
+              <a:t>Create fast, sound code with lots of help from compiler messages</a:t>
+            </a:r>
+          </a:p>
+          <a:p>
+            <a:pPr lvl="1"/>
+            <a:r>
+              <a:rPr lang="en-US" dirty="0"/>
+              <a:t>Great tooling: </a:t>
+            </a:r>
+            <a:r>
+              <a:rPr lang="en-US" dirty="0" err="1">
+                <a:hlinkClick r:id="rId4"/>
+              </a:rPr>
+              <a:t>RustBites_Tooling</a:t>
+            </a:r>
+            <a:r>
+              <a:rPr lang="en-US" dirty="0"/>
+              <a:t>, works on Windows, Linux, macOS</a:t>
+            </a:r>
+          </a:p>
+          <a:p>
+            <a:pPr lvl="1"/>
+            <a:r>
+              <a:rPr lang="en-US" dirty="0"/>
+              <a:t>Resources: e-books, active user forum, </a:t>
+            </a:r>
+            <a:r>
+              <a:rPr lang="en-US" dirty="0">
+                <a:hlinkClick r:id="rId5"/>
+              </a:rPr>
+              <a:t>https://crates.io</a:t>
             </a:r>
             <a:endParaRPr lang="en-US" dirty="0"/>
           </a:p>
           <a:p>
+            <a:pPr marL="457200" lvl="1" indent="0">
+              <a:buNone/>
+            </a:pPr>
+            <a:endParaRPr lang="en-US" dirty="0"/>
+          </a:p>
+          <a:p>
             <a:pPr lvl="1"/>
-            <a:r>
-              <a:rPr lang="en-US" dirty="0"/>
-              <a:t>Rust website lists 138 companies using Rust in production</a:t>
-            </a:r>
-          </a:p>
-          <a:p>
-            <a:pPr lvl="1"/>
-            <a:r>
-              <a:rPr lang="en-US" dirty="0" err="1"/>
-              <a:t>Tiobe</a:t>
-            </a:r>
-            <a:r>
-              <a:rPr lang="en-US" dirty="0"/>
-              <a:t> lists rust as 25</a:t>
-            </a:r>
-            <a:r>
-              <a:rPr lang="en-US" baseline="30000" dirty="0"/>
-              <a:t>th</a:t>
-            </a:r>
-            <a:r>
-              <a:rPr lang="en-US" dirty="0"/>
-              <a:t> in their language popularity index (Oct 2020).  </a:t>
-            </a:r>
+            <a:endParaRPr lang="en-US" dirty="0"/>
           </a:p>
         </p:txBody>
       </p:sp>
@@ -4186,7 +4122,7 @@
           <p:cNvPr id="4" name="Slide Number Placeholder 3">
             <a:extLst>
               <a:ext uri="{FF2B5EF4-FFF2-40B4-BE49-F238E27FC236}">
-                <a16:creationId xmlns:a16="http://schemas.microsoft.com/office/drawing/2014/main" id="{BF83AA05-66BB-431F-BE9C-9A286F190FEF}"/>
+                <a16:creationId xmlns:a16="http://schemas.microsoft.com/office/drawing/2014/main" id="{C1458565-BAB9-4E63-9E45-DD37D1BD1A4F}"/>
               </a:ext>
             </a:extLst>
           </p:cNvPr>
@@ -4213,7 +4149,7 @@
     </p:spTree>
     <p:extLst>
       <p:ext uri="{BB962C8B-B14F-4D97-AF65-F5344CB8AC3E}">
-        <p14:creationId xmlns:p14="http://schemas.microsoft.com/office/powerpoint/2010/main" val="664003782"/>
+        <p14:creationId xmlns:p14="http://schemas.microsoft.com/office/powerpoint/2010/main" val="2809018068"/>
       </p:ext>
     </p:extLst>
   </p:cSld>
@@ -4245,7 +4181,7 @@
           <p:cNvPr id="2" name="Title 1">
             <a:extLst>
               <a:ext uri="{FF2B5EF4-FFF2-40B4-BE49-F238E27FC236}">
-                <a16:creationId xmlns:a16="http://schemas.microsoft.com/office/drawing/2014/main" id="{3B51CB06-20F9-4D5D-9E36-87C19142DB53}"/>
+                <a16:creationId xmlns:a16="http://schemas.microsoft.com/office/drawing/2014/main" id="{3A1D5CF7-0D4F-4BAE-BA2C-566B721B4B29}"/>
               </a:ext>
             </a:extLst>
           </p:cNvPr>
@@ -4277,7 +4213,7 @@
           <a:p>
             <a:r>
               <a:rPr lang="en-US" dirty="0"/>
-              <a:t>Build-On Process</a:t>
+              <a:t>Build-On Motivation</a:t>
             </a:r>
           </a:p>
         </p:txBody>
@@ -4287,7 +4223,7 @@
           <p:cNvPr id="3" name="Content Placeholder 2">
             <a:extLst>
               <a:ext uri="{FF2B5EF4-FFF2-40B4-BE49-F238E27FC236}">
-                <a16:creationId xmlns:a16="http://schemas.microsoft.com/office/drawing/2014/main" id="{62CE037D-55B8-4B3B-A046-34952BCB0114}"/>
+                <a16:creationId xmlns:a16="http://schemas.microsoft.com/office/drawing/2014/main" id="{0E456118-B98A-4F38-8E30-CD16C343A8CA}"/>
               </a:ext>
             </a:extLst>
           </p:cNvPr>
@@ -4305,73 +4241,63 @@
           <a:p>
             <a:r>
               <a:rPr lang="en-US" dirty="0"/>
-              <a:t>Zoom meeting that:</a:t>
+              <a:t>Participate in a developer community interested in learning Rust</a:t>
+            </a:r>
+          </a:p>
+          <a:p>
+            <a:r>
+              <a:rPr lang="en-US" dirty="0"/>
+              <a:t>Stay in contact with SU Computer Engineering and Computer Science alumni</a:t>
+            </a:r>
+          </a:p>
+          <a:p>
+            <a:r>
+              <a:rPr lang="en-US" dirty="0"/>
+              <a:t>Support conversations about Rust and other interesting tech topics</a:t>
             </a:r>
           </a:p>
           <a:p>
             <a:pPr lvl="1"/>
             <a:r>
               <a:rPr lang="en-US" dirty="0"/>
-              <a:t>Briefly describes motives for using Rust and Rust basic ideas</a:t>
-            </a:r>
+              <a:t>Encourage both active learners and curious browsers</a:t>
+            </a:r>
+          </a:p>
+          <a:p>
+            <a:r>
+              <a:rPr lang="en-US" dirty="0"/>
+              <a:t>Rust is a very clever language supporting development of secure, high performance code (same ballpark as C++ without </a:t>
+            </a:r>
+            <a:r>
+              <a:rPr lang="en-US"/>
+              <a:t>undefined behavior)</a:t>
+            </a:r>
+            <a:endParaRPr lang="en-US" dirty="0"/>
           </a:p>
           <a:p>
             <a:pPr lvl="1"/>
             <a:r>
               <a:rPr lang="en-US" dirty="0"/>
-              <a:t>Provides two or three references</a:t>
+              <a:t>Rust website lists 138 companies using Rust in production</a:t>
             </a:r>
           </a:p>
           <a:p>
             <a:pPr lvl="1"/>
             <a:r>
+              <a:rPr lang="en-US" dirty="0" err="1"/>
+              <a:t>Tiobe</a:t>
+            </a:r>
+            <a:r>
               <a:rPr lang="en-US" dirty="0"/>
-              <a:t>identifies a problem and refers to starter code</a:t>
-            </a:r>
-          </a:p>
-          <a:p>
-            <a:pPr lvl="1"/>
+              <a:t> lists rust as 25</a:t>
+            </a:r>
+            <a:r>
+              <a:rPr lang="en-US" baseline="30000" dirty="0"/>
+              <a:t>th</a:t>
+            </a:r>
             <a:r>
               <a:rPr lang="en-US" dirty="0"/>
-              <a:t>Q&amp;A</a:t>
-            </a:r>
-          </a:p>
-          <a:p>
-            <a:r>
-              <a:rPr lang="en-US" dirty="0"/>
-              <a:t>Subsequent meetings </a:t>
-            </a:r>
-          </a:p>
-          <a:p>
-            <a:pPr lvl="1"/>
-            <a:r>
-              <a:rPr lang="en-US" dirty="0"/>
-              <a:t>Briefly describes my solution</a:t>
-            </a:r>
-          </a:p>
-          <a:p>
-            <a:pPr lvl="1"/>
-            <a:r>
-              <a:rPr lang="en-US" dirty="0"/>
-              <a:t>Others may discuss their solutions and/or problems</a:t>
-            </a:r>
-          </a:p>
-          <a:p>
-            <a:pPr lvl="1"/>
-            <a:r>
-              <a:rPr lang="en-US" dirty="0"/>
-              <a:t>Pose next extension </a:t>
-            </a:r>
-            <a:r>
-              <a:rPr lang="en-US"/>
-              <a:t>to problem</a:t>
-            </a:r>
-          </a:p>
-          <a:p>
-            <a:pPr lvl="1"/>
-            <a:r>
-              <a:rPr lang="en-US" dirty="0"/>
-              <a:t>Q&amp;A</a:t>
+              <a:t> in their language popularity index (Oct 2020).  </a:t>
             </a:r>
           </a:p>
         </p:txBody>
@@ -4381,7 +4307,7 @@
           <p:cNvPr id="4" name="Slide Number Placeholder 3">
             <a:extLst>
               <a:ext uri="{FF2B5EF4-FFF2-40B4-BE49-F238E27FC236}">
-                <a16:creationId xmlns:a16="http://schemas.microsoft.com/office/drawing/2014/main" id="{93B6B58E-E41D-4C01-893D-302C6BD53B2F}"/>
+                <a16:creationId xmlns:a16="http://schemas.microsoft.com/office/drawing/2014/main" id="{BF83AA05-66BB-431F-BE9C-9A286F190FEF}"/>
               </a:ext>
             </a:extLst>
           </p:cNvPr>
@@ -4400,6 +4326,201 @@
             <a:fld id="{9BDD3687-D8FB-4AFD-9AD8-D913B777D7F7}" type="slidenum">
               <a:rPr lang="en-US" smtClean="0"/>
               <a:t>12</a:t>
+            </a:fld>
+            <a:endParaRPr lang="en-US" dirty="0"/>
+          </a:p>
+        </p:txBody>
+      </p:sp>
+    </p:spTree>
+    <p:extLst>
+      <p:ext uri="{BB962C8B-B14F-4D97-AF65-F5344CB8AC3E}">
+        <p14:creationId xmlns:p14="http://schemas.microsoft.com/office/powerpoint/2010/main" val="664003782"/>
+      </p:ext>
+    </p:extLst>
+  </p:cSld>
+  <p:clrMapOvr>
+    <a:masterClrMapping/>
+  </p:clrMapOvr>
+</p:sld>
+</file>
+
+<file path=ppt/slides/slide13.xml><?xml version="1.0" encoding="utf-8"?>
+<p:sld xmlns:a="http://schemas.openxmlformats.org/drawingml/2006/main" xmlns:r="http://schemas.openxmlformats.org/officeDocument/2006/relationships" xmlns:p="http://schemas.openxmlformats.org/presentationml/2006/main" show="0">
+  <p:cSld>
+    <p:spTree>
+      <p:nvGrpSpPr>
+        <p:cNvPr id="1" name=""/>
+        <p:cNvGrpSpPr/>
+        <p:nvPr/>
+      </p:nvGrpSpPr>
+      <p:grpSpPr>
+        <a:xfrm>
+          <a:off x="0" y="0"/>
+          <a:ext cx="0" cy="0"/>
+          <a:chOff x="0" y="0"/>
+          <a:chExt cx="0" cy="0"/>
+        </a:xfrm>
+      </p:grpSpPr>
+      <p:sp>
+        <p:nvSpPr>
+          <p:cNvPr id="2" name="Title 1">
+            <a:extLst>
+              <a:ext uri="{FF2B5EF4-FFF2-40B4-BE49-F238E27FC236}">
+                <a16:creationId xmlns:a16="http://schemas.microsoft.com/office/drawing/2014/main" id="{3B51CB06-20F9-4D5D-9E36-87C19142DB53}"/>
+              </a:ext>
+            </a:extLst>
+          </p:cNvPr>
+          <p:cNvSpPr>
+            <a:spLocks noGrp="1"/>
+          </p:cNvSpPr>
+          <p:nvPr>
+            <p:ph type="title"/>
+          </p:nvPr>
+        </p:nvSpPr>
+        <p:spPr/>
+        <p:style>
+          <a:lnRef idx="2">
+            <a:schemeClr val="accent3"/>
+          </a:lnRef>
+          <a:fillRef idx="1">
+            <a:schemeClr val="lt1"/>
+          </a:fillRef>
+          <a:effectRef idx="0">
+            <a:schemeClr val="accent3"/>
+          </a:effectRef>
+          <a:fontRef idx="minor">
+            <a:schemeClr val="dk1"/>
+          </a:fontRef>
+        </p:style>
+        <p:txBody>
+          <a:bodyPr/>
+          <a:lstStyle/>
+          <a:p>
+            <a:r>
+              <a:rPr lang="en-US" dirty="0"/>
+              <a:t>Build-On Process</a:t>
+            </a:r>
+          </a:p>
+        </p:txBody>
+      </p:sp>
+      <p:sp>
+        <p:nvSpPr>
+          <p:cNvPr id="3" name="Content Placeholder 2">
+            <a:extLst>
+              <a:ext uri="{FF2B5EF4-FFF2-40B4-BE49-F238E27FC236}">
+                <a16:creationId xmlns:a16="http://schemas.microsoft.com/office/drawing/2014/main" id="{62CE037D-55B8-4B3B-A046-34952BCB0114}"/>
+              </a:ext>
+            </a:extLst>
+          </p:cNvPr>
+          <p:cNvSpPr>
+            <a:spLocks noGrp="1"/>
+          </p:cNvSpPr>
+          <p:nvPr>
+            <p:ph idx="1"/>
+          </p:nvPr>
+        </p:nvSpPr>
+        <p:spPr/>
+        <p:txBody>
+          <a:bodyPr/>
+          <a:lstStyle/>
+          <a:p>
+            <a:r>
+              <a:rPr lang="en-US" dirty="0"/>
+              <a:t>Zoom meeting that:</a:t>
+            </a:r>
+          </a:p>
+          <a:p>
+            <a:pPr lvl="1"/>
+            <a:r>
+              <a:rPr lang="en-US" dirty="0"/>
+              <a:t>Briefly describes motives for using Rust and Rust basic ideas</a:t>
+            </a:r>
+          </a:p>
+          <a:p>
+            <a:pPr lvl="1"/>
+            <a:r>
+              <a:rPr lang="en-US" dirty="0"/>
+              <a:t>Provides two or three references</a:t>
+            </a:r>
+          </a:p>
+          <a:p>
+            <a:pPr lvl="1"/>
+            <a:r>
+              <a:rPr lang="en-US" dirty="0"/>
+              <a:t>identifies a problem and refers to starter code</a:t>
+            </a:r>
+          </a:p>
+          <a:p>
+            <a:pPr lvl="1"/>
+            <a:r>
+              <a:rPr lang="en-US" dirty="0"/>
+              <a:t>Q&amp;A</a:t>
+            </a:r>
+          </a:p>
+          <a:p>
+            <a:r>
+              <a:rPr lang="en-US" dirty="0"/>
+              <a:t>Subsequent meetings </a:t>
+            </a:r>
+          </a:p>
+          <a:p>
+            <a:pPr lvl="1"/>
+            <a:r>
+              <a:rPr lang="en-US" dirty="0"/>
+              <a:t>Briefly describes my solution</a:t>
+            </a:r>
+          </a:p>
+          <a:p>
+            <a:pPr lvl="1"/>
+            <a:r>
+              <a:rPr lang="en-US" dirty="0"/>
+              <a:t>Others may discuss their solutions and/or problems</a:t>
+            </a:r>
+          </a:p>
+          <a:p>
+            <a:pPr lvl="1"/>
+            <a:r>
+              <a:rPr lang="en-US" dirty="0"/>
+              <a:t>Pose next extension </a:t>
+            </a:r>
+            <a:r>
+              <a:rPr lang="en-US"/>
+              <a:t>to problem</a:t>
+            </a:r>
+          </a:p>
+          <a:p>
+            <a:pPr lvl="1"/>
+            <a:r>
+              <a:rPr lang="en-US" dirty="0"/>
+              <a:t>Q&amp;A</a:t>
+            </a:r>
+          </a:p>
+        </p:txBody>
+      </p:sp>
+      <p:sp>
+        <p:nvSpPr>
+          <p:cNvPr id="4" name="Slide Number Placeholder 3">
+            <a:extLst>
+              <a:ext uri="{FF2B5EF4-FFF2-40B4-BE49-F238E27FC236}">
+                <a16:creationId xmlns:a16="http://schemas.microsoft.com/office/drawing/2014/main" id="{93B6B58E-E41D-4C01-893D-302C6BD53B2F}"/>
+              </a:ext>
+            </a:extLst>
+          </p:cNvPr>
+          <p:cNvSpPr>
+            <a:spLocks noGrp="1"/>
+          </p:cNvSpPr>
+          <p:nvPr>
+            <p:ph type="sldNum" sz="quarter" idx="12"/>
+          </p:nvPr>
+        </p:nvSpPr>
+        <p:spPr/>
+        <p:txBody>
+          <a:bodyPr/>
+          <a:lstStyle/>
+          <a:p>
+            <a:fld id="{9BDD3687-D8FB-4AFD-9AD8-D913B777D7F7}" type="slidenum">
+              <a:rPr lang="en-US" smtClean="0"/>
+              <a:t>13</a:t>
             </a:fld>
             <a:endParaRPr lang="en-US" dirty="0"/>
           </a:p>
@@ -5992,6 +6113,129 @@
       </p:grpSpPr>
       <p:sp>
         <p:nvSpPr>
+          <p:cNvPr id="2" name="Title 1">
+            <a:extLst>
+              <a:ext uri="{FF2B5EF4-FFF2-40B4-BE49-F238E27FC236}">
+                <a16:creationId xmlns:a16="http://schemas.microsoft.com/office/drawing/2014/main" id="{D91C7C38-1A94-4FA1-9F36-97F809DCD47A}"/>
+              </a:ext>
+            </a:extLst>
+          </p:cNvPr>
+          <p:cNvSpPr>
+            <a:spLocks noGrp="1"/>
+          </p:cNvSpPr>
+          <p:nvPr>
+            <p:ph type="title"/>
+          </p:nvPr>
+        </p:nvSpPr>
+        <p:spPr/>
+        <p:txBody>
+          <a:bodyPr/>
+          <a:lstStyle/>
+          <a:p>
+            <a:r>
+              <a:rPr lang="en-US" dirty="0"/>
+              <a:t>Parallel Text Search</a:t>
+            </a:r>
+          </a:p>
+        </p:txBody>
+      </p:sp>
+      <p:pic>
+        <p:nvPicPr>
+          <p:cNvPr id="6" name="Content Placeholder 5" descr="Diagram, schematic&#10;&#10;Description automatically generated">
+            <a:extLst>
+              <a:ext uri="{FF2B5EF4-FFF2-40B4-BE49-F238E27FC236}">
+                <a16:creationId xmlns:a16="http://schemas.microsoft.com/office/drawing/2014/main" id="{B4C05602-F71E-49B9-A09B-FD7AD5423CD7}"/>
+              </a:ext>
+            </a:extLst>
+          </p:cNvPr>
+          <p:cNvPicPr>
+            <a:picLocks noGrp="1" noChangeAspect="1"/>
+          </p:cNvPicPr>
+          <p:nvPr>
+            <p:ph idx="1"/>
+          </p:nvPr>
+        </p:nvPicPr>
+        <p:blipFill>
+          <a:blip r:embed="rId2">
+            <a:extLst>
+              <a:ext uri="{28A0092B-C50C-407E-A947-70E740481C1C}">
+                <a14:useLocalDpi xmlns:a14="http://schemas.microsoft.com/office/drawing/2010/main" val="0"/>
+              </a:ext>
+            </a:extLst>
+          </a:blip>
+          <a:stretch>
+            <a:fillRect/>
+          </a:stretch>
+        </p:blipFill>
+        <p:spPr>
+          <a:xfrm>
+            <a:off x="1362550" y="2135981"/>
+            <a:ext cx="9048275" cy="3351213"/>
+          </a:xfrm>
+        </p:spPr>
+      </p:pic>
+      <p:sp>
+        <p:nvSpPr>
+          <p:cNvPr id="4" name="Slide Number Placeholder 3">
+            <a:extLst>
+              <a:ext uri="{FF2B5EF4-FFF2-40B4-BE49-F238E27FC236}">
+                <a16:creationId xmlns:a16="http://schemas.microsoft.com/office/drawing/2014/main" id="{9AFC24C6-DF7A-44A0-A72A-BD5C15C3993B}"/>
+              </a:ext>
+            </a:extLst>
+          </p:cNvPr>
+          <p:cNvSpPr>
+            <a:spLocks noGrp="1"/>
+          </p:cNvSpPr>
+          <p:nvPr>
+            <p:ph type="sldNum" sz="quarter" idx="12"/>
+          </p:nvPr>
+        </p:nvSpPr>
+        <p:spPr/>
+        <p:txBody>
+          <a:bodyPr/>
+          <a:lstStyle/>
+          <a:p>
+            <a:fld id="{9BDD3687-D8FB-4AFD-9AD8-D913B777D7F7}" type="slidenum">
+              <a:rPr lang="en-US" smtClean="0"/>
+              <a:pPr/>
+              <a:t>7</a:t>
+            </a:fld>
+            <a:endParaRPr lang="en-US" dirty="0"/>
+          </a:p>
+        </p:txBody>
+      </p:sp>
+    </p:spTree>
+    <p:extLst>
+      <p:ext uri="{BB962C8B-B14F-4D97-AF65-F5344CB8AC3E}">
+        <p14:creationId xmlns:p14="http://schemas.microsoft.com/office/powerpoint/2010/main" val="1669621361"/>
+      </p:ext>
+    </p:extLst>
+  </p:cSld>
+  <p:clrMapOvr>
+    <a:masterClrMapping/>
+  </p:clrMapOvr>
+</p:sld>
+</file>
+
+<file path=ppt/slides/slide8.xml><?xml version="1.0" encoding="utf-8"?>
+<p:sld xmlns:a="http://schemas.openxmlformats.org/drawingml/2006/main" xmlns:r="http://schemas.openxmlformats.org/officeDocument/2006/relationships" xmlns:p="http://schemas.openxmlformats.org/presentationml/2006/main">
+  <p:cSld>
+    <p:spTree>
+      <p:nvGrpSpPr>
+        <p:cNvPr id="1" name=""/>
+        <p:cNvGrpSpPr/>
+        <p:nvPr/>
+      </p:nvGrpSpPr>
+      <p:grpSpPr>
+        <a:xfrm>
+          <a:off x="0" y="0"/>
+          <a:ext cx="0" cy="0"/>
+          <a:chOff x="0" y="0"/>
+          <a:chExt cx="0" cy="0"/>
+        </a:xfrm>
+      </p:grpSpPr>
+      <p:sp>
+        <p:nvSpPr>
           <p:cNvPr id="4" name="Title 3">
             <a:extLst>
               <a:ext uri="{FF2B5EF4-FFF2-40B4-BE49-F238E27FC236}">
@@ -6041,7 +6285,7 @@
           <a:p>
             <a:fld id="{9BDD3687-D8FB-4AFD-9AD8-D913B777D7F7}" type="slidenum">
               <a:rPr lang="en-US" sz="1600" smtClean="0"/>
-              <a:t>7</a:t>
+              <a:t>8</a:t>
             </a:fld>
             <a:endParaRPr lang="en-US" sz="1600" dirty="0"/>
           </a:p>
@@ -6060,7 +6304,7 @@
 </p:sld>
 </file>
 
-<file path=ppt/slides/slide8.xml><?xml version="1.0" encoding="utf-8"?>
+<file path=ppt/slides/slide9.xml><?xml version="1.0" encoding="utf-8"?>
 <p:sld xmlns:a="http://schemas.openxmlformats.org/drawingml/2006/main" xmlns:r="http://schemas.openxmlformats.org/officeDocument/2006/relationships" xmlns:p="http://schemas.openxmlformats.org/presentationml/2006/main" show="0">
   <p:cSld>
     <p:spTree>
@@ -6204,7 +6448,7 @@
             <a:fld id="{9BDD3687-D8FB-4AFD-9AD8-D913B777D7F7}" type="slidenum">
               <a:rPr lang="en-US" sz="1600" smtClean="0"/>
               <a:pPr/>
-              <a:t>8</a:t>
+              <a:t>9</a:t>
             </a:fld>
             <a:endParaRPr lang="en-US" sz="1600" dirty="0"/>
           </a:p>
@@ -6377,126 +6621,6 @@
     <p:extLst>
       <p:ext uri="{BB962C8B-B14F-4D97-AF65-F5344CB8AC3E}">
         <p14:creationId xmlns:p14="http://schemas.microsoft.com/office/powerpoint/2010/main" val="2108615762"/>
-      </p:ext>
-    </p:extLst>
-  </p:cSld>
-  <p:clrMapOvr>
-    <a:masterClrMapping/>
-  </p:clrMapOvr>
-</p:sld>
-</file>
-
-<file path=ppt/slides/slide9.xml><?xml version="1.0" encoding="utf-8"?>
-<p:sld xmlns:a="http://schemas.openxmlformats.org/drawingml/2006/main" xmlns:r="http://schemas.openxmlformats.org/officeDocument/2006/relationships" xmlns:p="http://schemas.openxmlformats.org/presentationml/2006/main" show="0">
-  <p:cSld>
-    <p:spTree>
-      <p:nvGrpSpPr>
-        <p:cNvPr id="1" name=""/>
-        <p:cNvGrpSpPr/>
-        <p:nvPr/>
-      </p:nvGrpSpPr>
-      <p:grpSpPr>
-        <a:xfrm>
-          <a:off x="0" y="0"/>
-          <a:ext cx="0" cy="0"/>
-          <a:chOff x="0" y="0"/>
-          <a:chExt cx="0" cy="0"/>
-        </a:xfrm>
-      </p:grpSpPr>
-      <p:sp>
-        <p:nvSpPr>
-          <p:cNvPr id="6" name="Title 5">
-            <a:extLst>
-              <a:ext uri="{FF2B5EF4-FFF2-40B4-BE49-F238E27FC236}">
-                <a16:creationId xmlns:a16="http://schemas.microsoft.com/office/drawing/2014/main" id="{016B22EA-8754-40DE-8352-F8CD3840C4CE}"/>
-              </a:ext>
-            </a:extLst>
-          </p:cNvPr>
-          <p:cNvSpPr>
-            <a:spLocks noGrp="1"/>
-          </p:cNvSpPr>
-          <p:nvPr>
-            <p:ph type="title"/>
-          </p:nvPr>
-        </p:nvSpPr>
-        <p:spPr/>
-        <p:txBody>
-          <a:bodyPr/>
-          <a:lstStyle/>
-          <a:p>
-            <a:endParaRPr lang="en-US"/>
-          </a:p>
-        </p:txBody>
-      </p:sp>
-      <p:sp>
-        <p:nvSpPr>
-          <p:cNvPr id="5" name="Slide Number Placeholder 4">
-            <a:extLst>
-              <a:ext uri="{FF2B5EF4-FFF2-40B4-BE49-F238E27FC236}">
-                <a16:creationId xmlns:a16="http://schemas.microsoft.com/office/drawing/2014/main" id="{06F1D7FA-9D75-4499-9E0F-85952ECDE993}"/>
-              </a:ext>
-            </a:extLst>
-          </p:cNvPr>
-          <p:cNvSpPr>
-            <a:spLocks noGrp="1"/>
-          </p:cNvSpPr>
-          <p:nvPr>
-            <p:ph type="sldNum" sz="quarter" idx="12"/>
-          </p:nvPr>
-        </p:nvSpPr>
-        <p:spPr/>
-        <p:txBody>
-          <a:bodyPr/>
-          <a:lstStyle/>
-          <a:p>
-            <a:fld id="{9BDD3687-D8FB-4AFD-9AD8-D913B777D7F7}" type="slidenum">
-              <a:rPr lang="en-US" smtClean="0"/>
-              <a:t>9</a:t>
-            </a:fld>
-            <a:endParaRPr lang="en-US"/>
-          </a:p>
-        </p:txBody>
-      </p:sp>
-      <p:pic>
-        <p:nvPicPr>
-          <p:cNvPr id="8" name="Picture 7" descr="Text&#10;&#10;Description automatically generated">
-            <a:extLst>
-              <a:ext uri="{FF2B5EF4-FFF2-40B4-BE49-F238E27FC236}">
-                <a16:creationId xmlns:a16="http://schemas.microsoft.com/office/drawing/2014/main" id="{1E04C856-02CD-40B9-8ED7-25E6C6BDC7E8}"/>
-              </a:ext>
-            </a:extLst>
-          </p:cNvPr>
-          <p:cNvPicPr>
-            <a:picLocks noChangeAspect="1"/>
-          </p:cNvPicPr>
-          <p:nvPr/>
-        </p:nvPicPr>
-        <p:blipFill>
-          <a:blip r:embed="rId2">
-            <a:extLst>
-              <a:ext uri="{28A0092B-C50C-407E-A947-70E740481C1C}">
-                <a14:useLocalDpi xmlns:a14="http://schemas.microsoft.com/office/drawing/2010/main" val="0"/>
-              </a:ext>
-            </a:extLst>
-          </a:blip>
-          <a:stretch>
-            <a:fillRect/>
-          </a:stretch>
-        </p:blipFill>
-        <p:spPr>
-          <a:xfrm>
-            <a:off x="497250" y="196831"/>
-            <a:ext cx="11197499" cy="6464338"/>
-          </a:xfrm>
-          <a:prstGeom prst="rect">
-            <a:avLst/>
-          </a:prstGeom>
-        </p:spPr>
-      </p:pic>
-    </p:spTree>
-    <p:extLst>
-      <p:ext uri="{BB962C8B-B14F-4D97-AF65-F5344CB8AC3E}">
-        <p14:creationId xmlns:p14="http://schemas.microsoft.com/office/powerpoint/2010/main" val="1780744226"/>
       </p:ext>
     </p:extLst>
   </p:cSld>

</xml_diff>

<commit_message>
edited links, added content to Step4 and Step6
</commit_message>
<xml_diff>
--- a/Resources/Build-On-5.pptx
+++ b/Resources/Build-On-5.pptx
@@ -209,7 +209,7 @@
           <a:p>
             <a:fld id="{0848BC6B-9879-4A5D-9ADD-7A7EC6F9DCFC}" type="datetimeFigureOut">
               <a:rPr lang="en-US" smtClean="0"/>
-              <a:t>4/8/2021</a:t>
+              <a:t>4/9/2021</a:t>
             </a:fld>
             <a:endParaRPr lang="en-US"/>
           </a:p>
@@ -623,7 +623,7 @@
           <a:p>
             <a:fld id="{743C5819-F2F0-4635-8846-E0D7F1235C4A}" type="datetime1">
               <a:rPr lang="en-US" smtClean="0"/>
-              <a:t>4/8/2021</a:t>
+              <a:t>4/9/2021</a:t>
             </a:fld>
             <a:endParaRPr lang="en-US"/>
           </a:p>
@@ -821,7 +821,7 @@
           <a:p>
             <a:fld id="{F9B384AA-5F95-4C33-968F-4281EE1C5D31}" type="datetime1">
               <a:rPr lang="en-US" smtClean="0"/>
-              <a:t>4/8/2021</a:t>
+              <a:t>4/9/2021</a:t>
             </a:fld>
             <a:endParaRPr lang="en-US"/>
           </a:p>
@@ -1029,7 +1029,7 @@
           <a:p>
             <a:fld id="{598AD886-C01A-47D5-80DD-8DE49FB67408}" type="datetime1">
               <a:rPr lang="en-US" smtClean="0"/>
-              <a:t>4/8/2021</a:t>
+              <a:t>4/9/2021</a:t>
             </a:fld>
             <a:endParaRPr lang="en-US"/>
           </a:p>
@@ -1227,7 +1227,7 @@
           <a:p>
             <a:fld id="{8D903533-41AC-45E1-9689-7E372F906C46}" type="datetime1">
               <a:rPr lang="en-US" smtClean="0"/>
-              <a:t>4/8/2021</a:t>
+              <a:t>4/9/2021</a:t>
             </a:fld>
             <a:endParaRPr lang="en-US"/>
           </a:p>
@@ -1507,7 +1507,7 @@
           <a:p>
             <a:fld id="{D64A9379-CA54-45F7-9973-2CA70E9FE0DA}" type="datetime1">
               <a:rPr lang="en-US" smtClean="0"/>
-              <a:t>4/8/2021</a:t>
+              <a:t>4/9/2021</a:t>
             </a:fld>
             <a:endParaRPr lang="en-US"/>
           </a:p>
@@ -1772,7 +1772,7 @@
           <a:p>
             <a:fld id="{F20E10C4-1FFF-436D-9146-BCABA5CCABDC}" type="datetime1">
               <a:rPr lang="en-US" smtClean="0"/>
-              <a:t>4/8/2021</a:t>
+              <a:t>4/9/2021</a:t>
             </a:fld>
             <a:endParaRPr lang="en-US"/>
           </a:p>
@@ -2184,7 +2184,7 @@
           <a:p>
             <a:fld id="{870AAD3C-0B7E-40D5-B7E8-235ABB682731}" type="datetime1">
               <a:rPr lang="en-US" smtClean="0"/>
-              <a:t>4/8/2021</a:t>
+              <a:t>4/9/2021</a:t>
             </a:fld>
             <a:endParaRPr lang="en-US"/>
           </a:p>
@@ -2325,7 +2325,7 @@
           <a:p>
             <a:fld id="{715EE6D3-C8C1-4419-90ED-DDD01668DDC0}" type="datetime1">
               <a:rPr lang="en-US" smtClean="0"/>
-              <a:t>4/8/2021</a:t>
+              <a:t>4/9/2021</a:t>
             </a:fld>
             <a:endParaRPr lang="en-US"/>
           </a:p>
@@ -2438,7 +2438,7 @@
           <a:p>
             <a:fld id="{38FB8FDC-B18A-4FED-99B0-72D3BD16FACD}" type="datetime1">
               <a:rPr lang="en-US" smtClean="0"/>
-              <a:t>4/8/2021</a:t>
+              <a:t>4/9/2021</a:t>
             </a:fld>
             <a:endParaRPr lang="en-US"/>
           </a:p>
@@ -2749,7 +2749,7 @@
           <a:p>
             <a:fld id="{CE06BDA3-8907-4DB2-BA4F-01F17DDA4A7B}" type="datetime1">
               <a:rPr lang="en-US" smtClean="0"/>
-              <a:t>4/8/2021</a:t>
+              <a:t>4/9/2021</a:t>
             </a:fld>
             <a:endParaRPr lang="en-US"/>
           </a:p>
@@ -3037,7 +3037,7 @@
           <a:p>
             <a:fld id="{E0CFAD89-B4BD-4F37-9D8A-960352BCDA8C}" type="datetime1">
               <a:rPr lang="en-US" smtClean="0"/>
-              <a:t>4/8/2021</a:t>
+              <a:t>4/9/2021</a:t>
             </a:fld>
             <a:endParaRPr lang="en-US"/>
           </a:p>
@@ -3278,7 +3278,7 @@
           <a:p>
             <a:fld id="{216CC113-4E9F-451A-BC11-83685A596D60}" type="datetime1">
               <a:rPr lang="en-US" smtClean="0"/>
-              <a:t>4/8/2021</a:t>
+              <a:t>4/9/2021</a:t>
             </a:fld>
             <a:endParaRPr lang="en-US"/>
           </a:p>
@@ -5440,16 +5440,19 @@
           <a:p>
             <a:pPr lvl="1"/>
             <a:r>
-              <a:rPr lang="en-US" sz="1600" dirty="0"/>
-              <a:t>Diagram next slide</a:t>
-            </a:r>
-          </a:p>
-          <a:p>
-            <a:pPr lvl="1"/>
-            <a:r>
               <a:rPr lang="en-US" sz="1600" dirty="0">
                 <a:hlinkClick r:id="rId5"/>
               </a:rPr>
+              <a:t>Project Structure</a:t>
+            </a:r>
+            <a:endParaRPr lang="en-US" sz="1600" dirty="0"/>
+          </a:p>
+          <a:p>
+            <a:pPr lvl="1"/>
+            <a:r>
+              <a:rPr lang="en-US" sz="1600" dirty="0">
+                <a:hlinkClick r:id="rId6"/>
+              </a:rPr>
               <a:t>Design Bites</a:t>
             </a:r>
             <a:r>
@@ -5468,7 +5471,7 @@
           <a:p>
             <a:r>
               <a:rPr lang="en-US" sz="2000" dirty="0" err="1">
-                <a:hlinkClick r:id="rId6"/>
+                <a:hlinkClick r:id="rId7"/>
               </a:rPr>
               <a:t>BuildOn</a:t>
             </a:r>
@@ -5484,14 +5487,6 @@
               <a:rPr lang="en-US" sz="2000" dirty="0"/>
               <a:t> code</a:t>
             </a:r>
-            <a:endParaRPr lang="en-US" sz="2000" dirty="0">
-              <a:hlinkClick r:id="rId7"/>
-            </a:endParaRPr>
-          </a:p>
-          <a:p>
-            <a:pPr marL="0" indent="0">
-              <a:buNone/>
-            </a:pPr>
             <a:endParaRPr lang="en-US" sz="2000" dirty="0">
               <a:hlinkClick r:id="rId8"/>
             </a:endParaRPr>
@@ -5502,6 +5497,14 @@
             </a:pPr>
             <a:endParaRPr lang="en-US" sz="2000" dirty="0">
               <a:hlinkClick r:id="rId9"/>
+            </a:endParaRPr>
+          </a:p>
+          <a:p>
+            <a:pPr marL="0" indent="0">
+              <a:buNone/>
+            </a:pPr>
+            <a:endParaRPr lang="en-US" sz="2000" dirty="0">
+              <a:hlinkClick r:id="rId10"/>
             </a:endParaRPr>
           </a:p>
         </p:txBody>
@@ -5589,7 +5592,7 @@
           <a:p>
             <a:r>
               <a:rPr lang="en-US" sz="2000" dirty="0">
-                <a:hlinkClick r:id="rId10"/>
+                <a:hlinkClick r:id="rId11"/>
               </a:rPr>
               <a:t>Macros</a:t>
             </a:r>
@@ -5598,21 +5601,21 @@
           <a:p>
             <a:r>
               <a:rPr lang="en-US" sz="2000" dirty="0">
+                <a:hlinkClick r:id="rId12"/>
+              </a:rPr>
+              <a:t>Debugging Rust in Visual Studio Code</a:t>
+            </a:r>
+            <a:endParaRPr lang="en-US" sz="2000" dirty="0"/>
+          </a:p>
+          <a:p>
+            <a:r>
+              <a:rPr lang="en-US" sz="2000" dirty="0" err="1">
                 <a:hlinkClick r:id="rId11"/>
               </a:rPr>
-              <a:t>Debugging Rust in Visual Studio Code</a:t>
-            </a:r>
-            <a:endParaRPr lang="en-US" sz="2000" dirty="0"/>
-          </a:p>
-          <a:p>
-            <a:r>
-              <a:rPr lang="en-US" sz="2000" dirty="0" err="1">
-                <a:hlinkClick r:id="rId10"/>
-              </a:rPr>
               <a:t>RustBites</a:t>
             </a:r>
             <a:endParaRPr lang="en-US" sz="2000" dirty="0">
-              <a:hlinkClick r:id="rId12" action="ppaction://hlinkfile"/>
+              <a:hlinkClick r:id="rId13" action="ppaction://hlinkfile"/>
             </a:endParaRPr>
           </a:p>
           <a:p>

</xml_diff>